<commit_message>
More work on 5505 video03
</commit_message>
<xml_diff>
--- a/introduction-to-r/src/v03-slides-and-speaker-notes.pptx
+++ b/introduction-to-r/src/v03-slides-and-speaker-notes.pptx
@@ -28702,44 +28702,13 @@
                 </a:solidFill>
                 <a:latin typeface="Courier"/>
               </a:rPr>
-              <a:t>read_delim</a:t>
+              <a:t>read_table</a:t>
             </a:r>
             <a:r>
               <a:rPr>
                 <a:latin typeface="Courier"/>
               </a:rPr>
               <a:t>(fn, </a:t>
-            </a:r>
-            <a:br/>
-            <a:r>
-              <a:rPr>
-                <a:latin typeface="Courier"/>
-              </a:rPr>
-              <a:t>  </a:t>
-            </a:r>
-            <a:r>
-              <a:rPr>
-                <a:solidFill>
-                  <a:srgbClr val="7D9029"/>
-                </a:solidFill>
-                <a:latin typeface="Courier"/>
-              </a:rPr>
-              <a:t>delim=</a:t>
-            </a:r>
-            <a:r>
-              <a:rPr>
-                <a:solidFill>
-                  <a:srgbClr val="880000"/>
-                </a:solidFill>
-                <a:latin typeface="Courier"/>
-              </a:rPr>
-              <a:t>NULL</a:t>
-            </a:r>
-            <a:r>
-              <a:rPr>
-                <a:latin typeface="Courier"/>
-              </a:rPr>
-              <a:t>,</a:t>
             </a:r>
             <a:br/>
             <a:r>
@@ -28842,8 +28811,8 @@
               <a:rPr>
                 <a:latin typeface="Courier"/>
               </a:rPr>
-              <a:t>## Warning: One or more parsing issues, see
-## `problems()` for details</a:t>
+              <a:t>## Warning: Insufficient `col_types`. Guessing 1
+## columns.</a:t>
             </a:r>
           </a:p>
         </p:txBody>
@@ -28952,13 +28921,13 @@
               <a:rPr>
                 <a:latin typeface="Courier"/>
               </a:rPr>
-              <a:t>## # A tibble: 4 x 4
-##       x y     X3        X4
-##   &lt;dbl&gt; &lt;lgl&gt; &lt;chr&gt;  &lt;dbl&gt;
-## 1     1 NA     &lt;NA&gt;      4
-## 2     2 NA     &lt;NA&gt;      8
-## 3     3 NA    "12\r"    NA
-## 4     4 NA    "16\r"    NA</a:t>
+              <a:t>## # A tibble: 4 x 2
+##       x     y
+##   &lt;dbl&gt; &lt;dbl&gt;
+## 1     1     4
+## 2     2     8
+## 3     3    12
+## 4     4    16</a:t>
             </a:r>
           </a:p>
         </p:txBody>

</xml_diff>